<commit_message>
Shortened hypotheses, added discussion points
</commit_message>
<xml_diff>
--- a/99_Thinktank/Talks/21-07-06_Kolloquium/Kolloquium_COG-ER-ED.pptx
+++ b/99_Thinktank/Talks/21-07-06_Kolloquium/Kolloquium_COG-ER-ED.pptx
@@ -10130,8 +10130,8 @@
         </p:nvSpPr>
         <p:spPr>
           <a:xfrm>
-            <a:off x="531623" y="1176738"/>
-            <a:ext cx="10394524" cy="4253678"/>
+            <a:off x="874715" y="1321706"/>
+            <a:ext cx="10205089" cy="4253678"/>
           </a:xfrm>
           <a:prstGeom prst="rect">
             <a:avLst/>
@@ -10318,12 +10318,39 @@
               </a:tabLst>
             </a:pPr>
             <a:r>
+              <a:rPr lang="en-US" sz="1600" dirty="0" smtClean="0">
+                <a:solidFill>
+                  <a:schemeClr val="tx1"/>
+                </a:solidFill>
+              </a:rPr>
+              <a:t>Low </a:t>
+            </a:r>
+            <a:r>
+              <a:rPr lang="en-US" sz="1600" dirty="0" smtClean="0">
+                <a:solidFill>
+                  <a:schemeClr val="tx1"/>
+                </a:solidFill>
+                <a:latin typeface="+mj-lt"/>
+              </a:rPr>
+              <a:t>NFC </a:t>
+            </a:r>
+            <a:r>
+              <a:rPr lang="en-US" sz="1600" dirty="0" smtClean="0">
+                <a:solidFill>
+                  <a:schemeClr val="tx1"/>
+                </a:solidFill>
+                <a:latin typeface="+mj-lt"/>
+                <a:cs typeface="Courier New" panose="02070309020205020404" pitchFamily="49" charset="0"/>
+              </a:rPr>
+              <a:t>→ </a:t>
+            </a:r>
+            <a:r>
               <a:rPr lang="en-US" sz="1600" dirty="0" err="1" smtClean="0">
                 <a:solidFill>
                   <a:schemeClr val="tx1"/>
                 </a:solidFill>
               </a:rPr>
-              <a:t>Personen</a:t>
+              <a:t>exponentiell</a:t>
             </a:r>
             <a:r>
               <a:rPr lang="en-US" sz="1600" dirty="0" smtClean="0">
@@ -10339,7 +10366,7 @@
                   <a:schemeClr val="tx1"/>
                 </a:solidFill>
               </a:rPr>
-              <a:t>mit</a:t>
+              <a:t>sinkender</a:t>
             </a:r>
             <a:r>
               <a:rPr lang="en-US" sz="1600" dirty="0" smtClean="0">
@@ -10355,128 +10382,13 @@
                   <a:schemeClr val="tx1"/>
                 </a:solidFill>
               </a:rPr>
-              <a:t>niedrigen</a:t>
-            </a:r>
-            <a:r>
-              <a:rPr lang="en-US" sz="1600" dirty="0" smtClean="0">
-                <a:solidFill>
-                  <a:schemeClr val="tx1"/>
-                </a:solidFill>
-              </a:rPr>
-              <a:t> </a:t>
-            </a:r>
-            <a:r>
-              <a:rPr lang="en-US" sz="1600" dirty="0" err="1" smtClean="0">
-                <a:solidFill>
-                  <a:schemeClr val="tx1"/>
-                </a:solidFill>
-              </a:rPr>
-              <a:t>Werten</a:t>
-            </a:r>
-            <a:r>
-              <a:rPr lang="en-US" sz="1600" dirty="0" smtClean="0">
-                <a:solidFill>
-                  <a:schemeClr val="tx1"/>
-                </a:solidFill>
-              </a:rPr>
-              <a:t> in NFC </a:t>
-            </a:r>
-            <a:r>
-              <a:rPr lang="en-US" sz="1600" dirty="0" err="1" smtClean="0">
-                <a:solidFill>
-                  <a:schemeClr val="tx1"/>
-                </a:solidFill>
-              </a:rPr>
-              <a:t>zeigen</a:t>
-            </a:r>
-            <a:r>
-              <a:rPr lang="en-US" sz="1600" dirty="0" smtClean="0">
-                <a:solidFill>
-                  <a:schemeClr val="tx1"/>
-                </a:solidFill>
-              </a:rPr>
-              <a:t> </a:t>
-            </a:r>
-            <a:r>
-              <a:rPr lang="en-US" sz="1600" dirty="0" err="1" smtClean="0">
-                <a:solidFill>
-                  <a:schemeClr val="tx1"/>
-                </a:solidFill>
-              </a:rPr>
-              <a:t>einen</a:t>
-            </a:r>
-            <a:r>
-              <a:rPr lang="en-US" sz="1600" dirty="0" smtClean="0">
-                <a:solidFill>
-                  <a:schemeClr val="tx1"/>
-                </a:solidFill>
-              </a:rPr>
-              <a:t> </a:t>
-            </a:r>
-            <a:r>
-              <a:rPr lang="en-US" sz="1600" dirty="0" err="1" smtClean="0">
-                <a:solidFill>
-                  <a:schemeClr val="tx1"/>
-                </a:solidFill>
-              </a:rPr>
-              <a:t>exponentiellen</a:t>
-            </a:r>
-            <a:r>
-              <a:rPr lang="en-US" sz="1600" dirty="0" smtClean="0">
-                <a:solidFill>
-                  <a:schemeClr val="tx1"/>
-                </a:solidFill>
-              </a:rPr>
-              <a:t> </a:t>
-            </a:r>
-            <a:r>
-              <a:rPr lang="en-US" sz="1600" dirty="0" err="1" smtClean="0">
-                <a:solidFill>
-                  <a:schemeClr val="tx1"/>
-                </a:solidFill>
-              </a:rPr>
               <a:t>Kurvenverlauf</a:t>
             </a:r>
-            <a:r>
-              <a:rPr lang="en-US" sz="1600" dirty="0" smtClean="0">
-                <a:solidFill>
-                  <a:schemeClr val="tx1"/>
-                </a:solidFill>
-              </a:rPr>
-              <a:t> (1-back hat den </a:t>
-            </a:r>
-            <a:r>
-              <a:rPr lang="en-US" sz="1600" dirty="0" err="1" smtClean="0">
-                <a:solidFill>
-                  <a:schemeClr val="tx1"/>
-                </a:solidFill>
-              </a:rPr>
-              <a:t>höchsten</a:t>
-            </a:r>
-            <a:r>
-              <a:rPr lang="en-US" sz="1600" dirty="0" smtClean="0">
-                <a:solidFill>
-                  <a:schemeClr val="tx1"/>
-                </a:solidFill>
-              </a:rPr>
-              <a:t> </a:t>
-            </a:r>
-            <a:r>
-              <a:rPr lang="en-US" sz="1600" dirty="0" err="1" smtClean="0">
-                <a:solidFill>
-                  <a:schemeClr val="tx1"/>
-                </a:solidFill>
-              </a:rPr>
-              <a:t>subjektiven</a:t>
-            </a:r>
-            <a:r>
-              <a:rPr lang="en-US" sz="1600" dirty="0" smtClean="0">
-                <a:solidFill>
-                  <a:schemeClr val="tx1"/>
-                </a:solidFill>
-              </a:rPr>
-              <a:t> Wert)</a:t>
-            </a:r>
+            <a:endParaRPr lang="en-US" sz="1600" dirty="0">
+              <a:solidFill>
+                <a:schemeClr val="tx1"/>
+              </a:solidFill>
+            </a:endParaRPr>
           </a:p>
           <a:p>
             <a:pPr marL="630238" indent="-342900">
@@ -10487,12 +10399,37 @@
               </a:tabLst>
             </a:pPr>
             <a:r>
+              <a:rPr lang="en-US" sz="1600" dirty="0" smtClean="0">
+                <a:solidFill>
+                  <a:schemeClr val="tx1"/>
+                </a:solidFill>
+              </a:rPr>
+              <a:t>High </a:t>
+            </a:r>
+            <a:r>
+              <a:rPr lang="en-US" sz="1600" dirty="0" smtClean="0">
+                <a:solidFill>
+                  <a:schemeClr val="tx1"/>
+                </a:solidFill>
+              </a:rPr>
+              <a:t>NFC </a:t>
+            </a:r>
+            <a:r>
+              <a:rPr lang="en-US" sz="1600" dirty="0">
+                <a:solidFill>
+                  <a:schemeClr val="tx1"/>
+                </a:solidFill>
+                <a:cs typeface="Courier New" panose="02070309020205020404" pitchFamily="49" charset="0"/>
+              </a:rPr>
+              <a:t>→ </a:t>
+            </a:r>
+            <a:r>
               <a:rPr lang="en-US" sz="1600" dirty="0" err="1" smtClean="0">
                 <a:solidFill>
                   <a:schemeClr val="tx1"/>
                 </a:solidFill>
               </a:rPr>
-              <a:t>Personen</a:t>
+              <a:t>rechtsschiefe</a:t>
             </a:r>
             <a:r>
               <a:rPr lang="en-US" sz="1600" dirty="0" smtClean="0">
@@ -10508,181 +10445,16 @@
                   <a:schemeClr val="tx1"/>
                 </a:solidFill>
               </a:rPr>
-              <a:t>mit</a:t>
-            </a:r>
-            <a:r>
-              <a:rPr lang="en-US" sz="1600" dirty="0" smtClean="0">
-                <a:solidFill>
-                  <a:schemeClr val="tx1"/>
-                </a:solidFill>
-              </a:rPr>
-              <a:t> </a:t>
-            </a:r>
-            <a:r>
-              <a:rPr lang="en-US" sz="1600" dirty="0" err="1" smtClean="0">
-                <a:solidFill>
-                  <a:schemeClr val="tx1"/>
-                </a:solidFill>
-              </a:rPr>
-              <a:t>hohen</a:t>
-            </a:r>
-            <a:r>
-              <a:rPr lang="en-US" sz="1600" dirty="0" smtClean="0">
-                <a:solidFill>
-                  <a:schemeClr val="tx1"/>
-                </a:solidFill>
-              </a:rPr>
-              <a:t> </a:t>
-            </a:r>
-            <a:r>
-              <a:rPr lang="en-US" sz="1600" dirty="0" err="1" smtClean="0">
-                <a:solidFill>
-                  <a:schemeClr val="tx1"/>
-                </a:solidFill>
-              </a:rPr>
-              <a:t>Werten</a:t>
-            </a:r>
-            <a:r>
-              <a:rPr lang="en-US" sz="1600" dirty="0" smtClean="0">
-                <a:solidFill>
-                  <a:schemeClr val="tx1"/>
-                </a:solidFill>
-              </a:rPr>
-              <a:t> in NFC </a:t>
-            </a:r>
-            <a:r>
-              <a:rPr lang="en-US" sz="1600" dirty="0" err="1" smtClean="0">
-                <a:solidFill>
-                  <a:schemeClr val="tx1"/>
-                </a:solidFill>
-              </a:rPr>
-              <a:t>zeigen</a:t>
-            </a:r>
-            <a:r>
-              <a:rPr lang="en-US" sz="1600" dirty="0" smtClean="0">
-                <a:solidFill>
-                  <a:schemeClr val="tx1"/>
-                </a:solidFill>
-              </a:rPr>
-              <a:t> </a:t>
-            </a:r>
-            <a:r>
-              <a:rPr lang="en-US" sz="1600" dirty="0" err="1" smtClean="0">
-                <a:solidFill>
-                  <a:schemeClr val="tx1"/>
-                </a:solidFill>
-              </a:rPr>
-              <a:t>eine</a:t>
-            </a:r>
-            <a:r>
-              <a:rPr lang="en-US" sz="1600" dirty="0" smtClean="0">
-                <a:solidFill>
-                  <a:schemeClr val="tx1"/>
-                </a:solidFill>
-              </a:rPr>
-              <a:t> </a:t>
-            </a:r>
-            <a:r>
-              <a:rPr lang="en-US" sz="1600" dirty="0" err="1" smtClean="0">
-                <a:solidFill>
-                  <a:schemeClr val="tx1"/>
-                </a:solidFill>
-              </a:rPr>
-              <a:t>rechtsschiefe</a:t>
-            </a:r>
-            <a:r>
-              <a:rPr lang="en-US" sz="1600" dirty="0" smtClean="0">
-                <a:solidFill>
-                  <a:schemeClr val="tx1"/>
-                </a:solidFill>
-              </a:rPr>
-              <a:t> </a:t>
-            </a:r>
-            <a:r>
-              <a:rPr lang="en-US" sz="1600" dirty="0" err="1" smtClean="0">
-                <a:solidFill>
-                  <a:schemeClr val="tx1"/>
-                </a:solidFill>
-              </a:rPr>
               <a:t>Verteilung</a:t>
             </a:r>
-            <a:r>
-              <a:rPr lang="en-US" sz="1600" dirty="0" smtClean="0">
-                <a:solidFill>
-                  <a:schemeClr val="tx1"/>
-                </a:solidFill>
-              </a:rPr>
-              <a:t> (1-back hat </a:t>
-            </a:r>
-            <a:r>
-              <a:rPr lang="en-US" sz="1600" dirty="0" err="1" smtClean="0">
-                <a:solidFill>
-                  <a:schemeClr val="tx1"/>
-                </a:solidFill>
-              </a:rPr>
-              <a:t>einen</a:t>
-            </a:r>
-            <a:r>
-              <a:rPr lang="en-US" sz="1600" dirty="0" smtClean="0">
-                <a:solidFill>
-                  <a:schemeClr val="tx1"/>
-                </a:solidFill>
-              </a:rPr>
-              <a:t> </a:t>
-            </a:r>
-            <a:r>
-              <a:rPr lang="en-US" sz="1600" dirty="0" err="1" smtClean="0">
-                <a:solidFill>
-                  <a:schemeClr val="tx1"/>
-                </a:solidFill>
-              </a:rPr>
-              <a:t>geringeren</a:t>
-            </a:r>
-            <a:r>
-              <a:rPr lang="en-US" sz="1600" dirty="0" smtClean="0">
-                <a:solidFill>
-                  <a:schemeClr val="tx1"/>
-                </a:solidFill>
-              </a:rPr>
-              <a:t> </a:t>
-            </a:r>
-            <a:r>
-              <a:rPr lang="en-US" sz="1600" dirty="0" err="1" smtClean="0">
-                <a:solidFill>
-                  <a:schemeClr val="tx1"/>
-                </a:solidFill>
-              </a:rPr>
-              <a:t>subjektiven</a:t>
-            </a:r>
-            <a:r>
-              <a:rPr lang="en-US" sz="1600" dirty="0" smtClean="0">
-                <a:solidFill>
-                  <a:schemeClr val="tx1"/>
-                </a:solidFill>
-              </a:rPr>
-              <a:t> Wert, </a:t>
-            </a:r>
-            <a:r>
-              <a:rPr lang="en-US" sz="1600" dirty="0" err="1" smtClean="0">
-                <a:solidFill>
-                  <a:schemeClr val="tx1"/>
-                </a:solidFill>
-              </a:rPr>
-              <a:t>als</a:t>
-            </a:r>
-            <a:r>
-              <a:rPr lang="en-US" sz="1600" dirty="0" smtClean="0">
-                <a:solidFill>
-                  <a:schemeClr val="tx1"/>
-                </a:solidFill>
-              </a:rPr>
-              <a:t> 2-back)</a:t>
-            </a:r>
+            <a:endParaRPr lang="en-US" sz="1600" dirty="0" smtClean="0">
+              <a:solidFill>
+                <a:schemeClr val="tx1"/>
+              </a:solidFill>
+            </a:endParaRPr>
           </a:p>
           <a:p>
-            <a:pPr marL="630238" indent="-342900">
-              <a:buFont typeface="+mj-lt"/>
-              <a:buAutoNum type="alphaLcParenR"/>
+            <a:pPr marL="287338">
               <a:tabLst>
                 <a:tab pos="539750" algn="l"/>
               </a:tabLst>
@@ -10799,7 +10571,23 @@
                   <a:schemeClr val="tx1"/>
                 </a:solidFill>
               </a:rPr>
-              <a:t> positive </a:t>
+              <a:t> </a:t>
+            </a:r>
+            <a:r>
+              <a:rPr lang="en-US" sz="1600" dirty="0" err="1" smtClean="0">
+                <a:solidFill>
+                  <a:schemeClr val="tx1"/>
+                </a:solidFill>
+              </a:rPr>
+              <a:t>positiv</a:t>
+            </a:r>
+            <a:r>
+              <a:rPr lang="en-US" sz="1600" dirty="0" smtClean="0">
+                <a:solidFill>
+                  <a:schemeClr val="tx1"/>
+                </a:solidFill>
+              </a:rPr>
+              <a:t> </a:t>
             </a:r>
             <a:r>
               <a:rPr lang="en-US" sz="1600" dirty="0" err="1" smtClean="0">
@@ -11019,7 +10807,7 @@
                   <a:schemeClr val="tx1"/>
                 </a:solidFill>
               </a:rPr>
-              <a:t>In </a:t>
+              <a:t>Die AUC </a:t>
             </a:r>
             <a:r>
               <a:rPr lang="en-US" sz="1600" dirty="0" err="1" smtClean="0">
@@ -11027,7 +10815,7 @@
                   <a:schemeClr val="tx1"/>
                 </a:solidFill>
               </a:rPr>
-              <a:t>einer</a:t>
+              <a:t>kann</a:t>
             </a:r>
             <a:r>
               <a:rPr lang="en-US" sz="1600" dirty="0" smtClean="0">
@@ -11043,7 +10831,7 @@
                   <a:schemeClr val="tx1"/>
                 </a:solidFill>
               </a:rPr>
-              <a:t>multiplen</a:t>
+              <a:t>Varianz</a:t>
             </a:r>
             <a:r>
               <a:rPr lang="en-US" sz="1600" dirty="0" smtClean="0">
@@ -11051,7 +10839,7 @@
                   <a:schemeClr val="tx1"/>
                 </a:solidFill>
               </a:rPr>
-              <a:t> Regression </a:t>
+              <a:t> in NFC </a:t>
             </a:r>
             <a:r>
               <a:rPr lang="en-US" sz="1600" dirty="0" err="1" smtClean="0">
@@ -11059,7 +10847,7 @@
                   <a:schemeClr val="tx1"/>
                 </a:solidFill>
               </a:rPr>
-              <a:t>mit</a:t>
+              <a:t>über</a:t>
             </a:r>
             <a:r>
               <a:rPr lang="en-US" sz="1600" dirty="0" smtClean="0">
@@ -11067,7 +10855,15 @@
                   <a:schemeClr val="tx1"/>
                 </a:solidFill>
               </a:rPr>
-              <a:t> AUC </a:t>
+              <a:t> den </a:t>
+            </a:r>
+            <a:r>
+              <a:rPr lang="en-US" sz="1600" dirty="0" smtClean="0">
+                <a:solidFill>
+                  <a:schemeClr val="tx1"/>
+                </a:solidFill>
+              </a:rPr>
+              <a:t>NTLX </a:t>
             </a:r>
             <a:r>
               <a:rPr lang="en-US" sz="1600" dirty="0" err="1" smtClean="0">
@@ -11075,7 +10871,7 @@
                   <a:schemeClr val="tx1"/>
                 </a:solidFill>
               </a:rPr>
-              <a:t>als</a:t>
+              <a:t>hinaus</a:t>
             </a:r>
             <a:r>
               <a:rPr lang="en-US" sz="1600" dirty="0" smtClean="0">
@@ -11091,226 +10887,7 @@
                   <a:schemeClr val="tx1"/>
                 </a:solidFill>
               </a:rPr>
-              <a:t>zweiten</a:t>
-            </a:r>
-            <a:r>
-              <a:rPr lang="en-US" sz="1600" dirty="0" smtClean="0">
-                <a:solidFill>
-                  <a:schemeClr val="tx1"/>
-                </a:solidFill>
-              </a:rPr>
-              <a:t> </a:t>
-            </a:r>
-            <a:r>
-              <a:rPr lang="en-US" sz="1600" dirty="0" err="1" smtClean="0">
-                <a:solidFill>
-                  <a:schemeClr val="tx1"/>
-                </a:solidFill>
-              </a:rPr>
-              <a:t>Prädiktor</a:t>
-            </a:r>
-            <a:r>
-              <a:rPr lang="en-US" sz="1600" dirty="0" smtClean="0">
-                <a:solidFill>
-                  <a:schemeClr val="tx1"/>
-                </a:solidFill>
-              </a:rPr>
-              <a:t> </a:t>
-            </a:r>
-            <a:r>
-              <a:rPr lang="en-US" sz="1600" dirty="0" err="1" smtClean="0">
-                <a:solidFill>
-                  <a:schemeClr val="tx1"/>
-                </a:solidFill>
-              </a:rPr>
-              <a:t>kann</a:t>
-            </a:r>
-            <a:r>
-              <a:rPr lang="en-US" sz="1600" dirty="0" smtClean="0">
-                <a:solidFill>
-                  <a:schemeClr val="tx1"/>
-                </a:solidFill>
-              </a:rPr>
-              <a:t> der NTLX (task-load questionnaire) NFC </a:t>
-            </a:r>
-            <a:r>
-              <a:rPr lang="en-US" sz="1600" dirty="0" err="1" smtClean="0">
-                <a:solidFill>
-                  <a:schemeClr val="tx1"/>
-                </a:solidFill>
-              </a:rPr>
-              <a:t>nicht</a:t>
-            </a:r>
-            <a:r>
-              <a:rPr lang="en-US" sz="1600" dirty="0" smtClean="0">
-                <a:solidFill>
-                  <a:schemeClr val="tx1"/>
-                </a:solidFill>
-              </a:rPr>
-              <a:t> </a:t>
-            </a:r>
-            <a:r>
-              <a:rPr lang="en-US" sz="1600" dirty="0" err="1" smtClean="0">
-                <a:solidFill>
-                  <a:schemeClr val="tx1"/>
-                </a:solidFill>
-              </a:rPr>
-              <a:t>vorhersagen</a:t>
-            </a:r>
-            <a:endParaRPr lang="en-US" sz="1600" dirty="0">
-              <a:solidFill>
-                <a:schemeClr val="tx1"/>
-              </a:solidFill>
-            </a:endParaRPr>
-          </a:p>
-          <a:p>
-            <a:pPr marL="625475" indent="-342900">
-              <a:buFont typeface="+mj-lt"/>
-              <a:buAutoNum type="alphaLcParenR"/>
-            </a:pPr>
-            <a:r>
-              <a:rPr lang="en-US" sz="1600" dirty="0" smtClean="0">
-                <a:solidFill>
-                  <a:schemeClr val="tx1"/>
-                </a:solidFill>
-              </a:rPr>
-              <a:t>In </a:t>
-            </a:r>
-            <a:r>
-              <a:rPr lang="en-US" sz="1600" dirty="0" err="1" smtClean="0">
-                <a:solidFill>
-                  <a:schemeClr val="tx1"/>
-                </a:solidFill>
-              </a:rPr>
-              <a:t>einer</a:t>
-            </a:r>
-            <a:r>
-              <a:rPr lang="en-US" sz="1600" dirty="0" smtClean="0">
-                <a:solidFill>
-                  <a:schemeClr val="tx1"/>
-                </a:solidFill>
-              </a:rPr>
-              <a:t> </a:t>
-            </a:r>
-            <a:r>
-              <a:rPr lang="en-US" sz="1600" dirty="0" err="1" smtClean="0">
-                <a:solidFill>
-                  <a:schemeClr val="tx1"/>
-                </a:solidFill>
-              </a:rPr>
-              <a:t>multiplen</a:t>
-            </a:r>
-            <a:r>
-              <a:rPr lang="en-US" sz="1600" dirty="0" smtClean="0">
-                <a:solidFill>
-                  <a:schemeClr val="tx1"/>
-                </a:solidFill>
-              </a:rPr>
-              <a:t> Regression </a:t>
-            </a:r>
-            <a:r>
-              <a:rPr lang="en-US" sz="1600" dirty="0" err="1" smtClean="0">
-                <a:solidFill>
-                  <a:schemeClr val="tx1"/>
-                </a:solidFill>
-              </a:rPr>
-              <a:t>mit</a:t>
-            </a:r>
-            <a:r>
-              <a:rPr lang="en-US" sz="1600" dirty="0">
-                <a:solidFill>
-                  <a:schemeClr val="tx1"/>
-                </a:solidFill>
-              </a:rPr>
-              <a:t> </a:t>
-            </a:r>
-            <a:r>
-              <a:rPr lang="en-US" sz="1600" dirty="0" smtClean="0">
-                <a:solidFill>
-                  <a:schemeClr val="tx1"/>
-                </a:solidFill>
-              </a:rPr>
-              <a:t>NTLX </a:t>
-            </a:r>
-            <a:r>
-              <a:rPr lang="en-US" sz="1600" dirty="0" err="1" smtClean="0">
-                <a:solidFill>
-                  <a:schemeClr val="tx1"/>
-                </a:solidFill>
-              </a:rPr>
-              <a:t>als</a:t>
-            </a:r>
-            <a:r>
-              <a:rPr lang="en-US" sz="1600" dirty="0" smtClean="0">
-                <a:solidFill>
-                  <a:schemeClr val="tx1"/>
-                </a:solidFill>
-              </a:rPr>
-              <a:t> </a:t>
-            </a:r>
-            <a:r>
-              <a:rPr lang="en-US" sz="1600" dirty="0" err="1" smtClean="0">
-                <a:solidFill>
-                  <a:schemeClr val="tx1"/>
-                </a:solidFill>
-              </a:rPr>
-              <a:t>zweiten</a:t>
-            </a:r>
-            <a:r>
-              <a:rPr lang="en-US" sz="1600" dirty="0" smtClean="0">
-                <a:solidFill>
-                  <a:schemeClr val="tx1"/>
-                </a:solidFill>
-              </a:rPr>
-              <a:t> </a:t>
-            </a:r>
-            <a:r>
-              <a:rPr lang="en-US" sz="1600" dirty="0" err="1" smtClean="0">
-                <a:solidFill>
-                  <a:schemeClr val="tx1"/>
-                </a:solidFill>
-              </a:rPr>
-              <a:t>Prädiktor</a:t>
-            </a:r>
-            <a:r>
-              <a:rPr lang="en-US" sz="1600" dirty="0" smtClean="0">
-                <a:solidFill>
-                  <a:schemeClr val="tx1"/>
-                </a:solidFill>
-              </a:rPr>
-              <a:t> </a:t>
-            </a:r>
-            <a:r>
-              <a:rPr lang="en-US" sz="1600" dirty="0" err="1" smtClean="0">
-                <a:solidFill>
-                  <a:schemeClr val="tx1"/>
-                </a:solidFill>
-              </a:rPr>
-              <a:t>kann</a:t>
-            </a:r>
-            <a:r>
-              <a:rPr lang="en-US" sz="1600" dirty="0" smtClean="0">
-                <a:solidFill>
-                  <a:schemeClr val="tx1"/>
-                </a:solidFill>
-              </a:rPr>
-              <a:t> AUC NFC </a:t>
-            </a:r>
-            <a:r>
-              <a:rPr lang="en-US" sz="1600" dirty="0" err="1" smtClean="0">
-                <a:solidFill>
-                  <a:schemeClr val="tx1"/>
-                </a:solidFill>
-              </a:rPr>
-              <a:t>vorhersagen</a:t>
-            </a:r>
-            <a:r>
-              <a:rPr lang="en-US" sz="1600" dirty="0" smtClean="0">
-                <a:solidFill>
-                  <a:schemeClr val="tx1"/>
-                </a:solidFill>
-              </a:rPr>
-              <a:t>.</a:t>
+              <a:t>erklären</a:t>
             </a:r>
             <a:endParaRPr lang="en-US" sz="1600" dirty="0">
               <a:solidFill>
@@ -11605,6 +11182,203 @@
               <a:solidFill>
                 <a:schemeClr val="tx1"/>
               </a:solidFill>
+            </a:endParaRPr>
+          </a:p>
+        </p:txBody>
+      </p:sp>
+      <p:sp>
+        <p:nvSpPr>
+          <p:cNvPr id="4" name="Rechteck 3">
+            <a:extLst>
+              <a:ext uri="{FF2B5EF4-FFF2-40B4-BE49-F238E27FC236}">
+                <a16:creationId xmlns:a16="http://schemas.microsoft.com/office/drawing/2014/main" id="{9B2DBABE-10CA-3F46-8C45-F6A1E8CBC230}"/>
+              </a:ext>
+            </a:extLst>
+          </p:cNvPr>
+          <p:cNvSpPr/>
+          <p:nvPr/>
+        </p:nvSpPr>
+        <p:spPr>
+          <a:xfrm>
+            <a:off x="0" y="6129339"/>
+            <a:ext cx="12192000" cy="728662"/>
+          </a:xfrm>
+          <a:prstGeom prst="rect">
+            <a:avLst/>
+          </a:prstGeom>
+          <a:solidFill>
+            <a:schemeClr val="bg1">
+              <a:lumMod val="95000"/>
+            </a:schemeClr>
+          </a:solidFill>
+          <a:ln>
+            <a:noFill/>
+          </a:ln>
+        </p:spPr>
+        <p:style>
+          <a:lnRef idx="1">
+            <a:schemeClr val="accent1"/>
+          </a:lnRef>
+          <a:fillRef idx="3">
+            <a:schemeClr val="accent1"/>
+          </a:fillRef>
+          <a:effectRef idx="2">
+            <a:schemeClr val="accent1"/>
+          </a:effectRef>
+          <a:fontRef idx="minor">
+            <a:schemeClr val="lt1"/>
+          </a:fontRef>
+        </p:style>
+        <p:txBody>
+          <a:bodyPr anchor="ctr"/>
+          <a:lstStyle/>
+          <a:p>
+            <a:pPr algn="ctr" defTabSz="534988">
+              <a:spcAft>
+                <a:spcPts val="1175"/>
+              </a:spcAft>
+              <a:defRPr/>
+            </a:pPr>
+            <a:r>
+              <a:rPr lang="de-DE" sz="1800" spc="-20" dirty="0" smtClean="0">
+                <a:solidFill>
+                  <a:schemeClr val="bg1">
+                    <a:lumMod val="50000"/>
+                  </a:schemeClr>
+                </a:solidFill>
+                <a:ea typeface="Calibri"/>
+                <a:cs typeface="Open Sans Normal" charset="0"/>
+              </a:rPr>
+              <a:t>Kramer et al. (2021). </a:t>
+            </a:r>
+            <a:r>
+              <a:rPr lang="de-DE" sz="1800" i="1" spc="-20" dirty="0" err="1" smtClean="0">
+                <a:solidFill>
+                  <a:schemeClr val="bg1">
+                    <a:lumMod val="50000"/>
+                  </a:schemeClr>
+                </a:solidFill>
+                <a:ea typeface="Calibri"/>
+                <a:cs typeface="Open Sans Normal" charset="0"/>
+              </a:rPr>
+              <a:t>CogDev</a:t>
+            </a:r>
+            <a:r>
+              <a:rPr lang="de-DE" sz="1800" i="1" spc="-20" dirty="0" smtClean="0">
+                <a:solidFill>
+                  <a:schemeClr val="bg1">
+                    <a:lumMod val="50000"/>
+                  </a:schemeClr>
+                </a:solidFill>
+                <a:ea typeface="Calibri"/>
+                <a:cs typeface="Open Sans Normal" charset="0"/>
+              </a:rPr>
+              <a:t> </a:t>
+            </a:r>
+            <a:r>
+              <a:rPr lang="de-DE" sz="1800" spc="-20" dirty="0" smtClean="0">
+                <a:solidFill>
+                  <a:schemeClr val="bg1">
+                    <a:lumMod val="50000"/>
+                  </a:schemeClr>
+                </a:solidFill>
+                <a:ea typeface="Calibri"/>
+                <a:cs typeface="Open Sans Normal" charset="0"/>
+              </a:rPr>
+              <a:t>57: 100978., </a:t>
+            </a:r>
+            <a:r>
+              <a:rPr lang="de-DE" sz="1800" spc="-20" dirty="0" err="1" smtClean="0">
+                <a:solidFill>
+                  <a:schemeClr val="bg1">
+                    <a:lumMod val="50000"/>
+                  </a:schemeClr>
+                </a:solidFill>
+                <a:ea typeface="Calibri"/>
+                <a:cs typeface="Open Sans Normal" charset="0"/>
+              </a:rPr>
+              <a:t>Westbrook</a:t>
+            </a:r>
+            <a:r>
+              <a:rPr lang="de-DE" sz="1800" spc="-20" dirty="0" smtClean="0">
+                <a:solidFill>
+                  <a:schemeClr val="bg1">
+                    <a:lumMod val="50000"/>
+                  </a:schemeClr>
+                </a:solidFill>
+                <a:ea typeface="Calibri"/>
+                <a:cs typeface="Open Sans Normal" charset="0"/>
+              </a:rPr>
+              <a:t> </a:t>
+            </a:r>
+            <a:r>
+              <a:rPr lang="de-DE" sz="1800" spc="-20" dirty="0" smtClean="0">
+                <a:solidFill>
+                  <a:schemeClr val="bg1">
+                    <a:lumMod val="50000"/>
+                  </a:schemeClr>
+                </a:solidFill>
+                <a:ea typeface="Calibri"/>
+                <a:cs typeface="Open Sans Normal" charset="0"/>
+              </a:rPr>
+              <a:t>et al. (2013). </a:t>
+            </a:r>
+            <a:r>
+              <a:rPr lang="de-DE" sz="1800" i="1" spc="-20" dirty="0" err="1" smtClean="0">
+                <a:solidFill>
+                  <a:schemeClr val="bg1">
+                    <a:lumMod val="50000"/>
+                  </a:schemeClr>
+                </a:solidFill>
+                <a:ea typeface="Calibri"/>
+                <a:cs typeface="Open Sans Normal" charset="0"/>
+              </a:rPr>
+              <a:t>PLoS</a:t>
+            </a:r>
+            <a:r>
+              <a:rPr lang="de-DE" sz="1800" i="1" spc="-20" dirty="0" smtClean="0">
+                <a:solidFill>
+                  <a:schemeClr val="bg1">
+                    <a:lumMod val="50000"/>
+                  </a:schemeClr>
+                </a:solidFill>
+                <a:ea typeface="Calibri"/>
+                <a:cs typeface="Open Sans Normal" charset="0"/>
+              </a:rPr>
+              <a:t> ONE 8</a:t>
+            </a:r>
+            <a:r>
+              <a:rPr lang="de-DE" sz="1800" spc="-20" dirty="0" smtClean="0">
+                <a:solidFill>
+                  <a:schemeClr val="bg1">
+                    <a:lumMod val="50000"/>
+                  </a:schemeClr>
+                </a:solidFill>
+                <a:ea typeface="Calibri"/>
+                <a:cs typeface="Open Sans Normal" charset="0"/>
+              </a:rPr>
+              <a:t>(7): e68210</a:t>
+            </a:r>
+            <a:r>
+              <a:rPr lang="de-DE" i="1" spc="-20" dirty="0" smtClean="0">
+                <a:solidFill>
+                  <a:schemeClr val="bg1">
+                    <a:lumMod val="50000"/>
+                  </a:schemeClr>
+                </a:solidFill>
+                <a:ea typeface="Calibri"/>
+                <a:cs typeface="Open Sans Normal" charset="0"/>
+              </a:rPr>
+              <a:t>.</a:t>
+            </a:r>
+            <a:endParaRPr lang="de-DE" sz="1800" spc="-20" dirty="0">
+              <a:solidFill>
+                <a:schemeClr val="bg1">
+                  <a:lumMod val="50000"/>
+                </a:schemeClr>
+              </a:solidFill>
+              <a:ea typeface="Calibri"/>
+              <a:cs typeface="Open Sans Normal" charset="0"/>
             </a:endParaRPr>
           </a:p>
         </p:txBody>
@@ -16630,8 +16404,8 @@
         </p:nvSpPr>
         <p:spPr>
           <a:xfrm>
-            <a:off x="874712" y="1071155"/>
-            <a:ext cx="10668997" cy="4723155"/>
+            <a:off x="874715" y="1206229"/>
+            <a:ext cx="10668997" cy="3654225"/>
           </a:xfrm>
           <a:prstGeom prst="rect">
             <a:avLst/>
@@ -16736,10 +16510,6 @@
             </a:endParaRPr>
           </a:p>
           <a:p>
-            <a:pPr marL="285750" indent="-285750">
-              <a:buFontTx/>
-              <a:buChar char="-"/>
-            </a:pPr>
             <a:endParaRPr lang="en-GB" sz="1600" dirty="0" smtClean="0">
               <a:solidFill>
                 <a:srgbClr val="000000"/>
@@ -16751,6 +16521,200 @@
               <a:buFontTx/>
               <a:buChar char="-"/>
             </a:pPr>
+            <a:r>
+              <a:rPr lang="en-GB" sz="1600" dirty="0" err="1" smtClean="0">
+                <a:solidFill>
+                  <a:srgbClr val="000000"/>
+                </a:solidFill>
+              </a:rPr>
+              <a:t>Wovon</a:t>
+            </a:r>
+            <a:r>
+              <a:rPr lang="en-GB" sz="1600" dirty="0" smtClean="0">
+                <a:solidFill>
+                  <a:srgbClr val="000000"/>
+                </a:solidFill>
+              </a:rPr>
+              <a:t> </a:t>
+            </a:r>
+            <a:r>
+              <a:rPr lang="en-GB" sz="1600" dirty="0" err="1" smtClean="0">
+                <a:solidFill>
+                  <a:srgbClr val="000000"/>
+                </a:solidFill>
+              </a:rPr>
+              <a:t>machen</a:t>
+            </a:r>
+            <a:r>
+              <a:rPr lang="en-GB" sz="1600" dirty="0" smtClean="0">
+                <a:solidFill>
+                  <a:srgbClr val="000000"/>
+                </a:solidFill>
+              </a:rPr>
+              <a:t> </a:t>
+            </a:r>
+            <a:r>
+              <a:rPr lang="en-GB" sz="1600" dirty="0" err="1" smtClean="0">
+                <a:solidFill>
+                  <a:srgbClr val="000000"/>
+                </a:solidFill>
+              </a:rPr>
+              <a:t>wir</a:t>
+            </a:r>
+            <a:r>
+              <a:rPr lang="en-GB" sz="1600" dirty="0" smtClean="0">
+                <a:solidFill>
+                  <a:srgbClr val="000000"/>
+                </a:solidFill>
+              </a:rPr>
+              <a:t> </a:t>
+            </a:r>
+            <a:r>
+              <a:rPr lang="en-GB" sz="1600" dirty="0" err="1" smtClean="0">
+                <a:solidFill>
+                  <a:srgbClr val="000000"/>
+                </a:solidFill>
+              </a:rPr>
+              <a:t>abhängig</a:t>
+            </a:r>
+            <a:r>
+              <a:rPr lang="en-GB" sz="1600" dirty="0" smtClean="0">
+                <a:solidFill>
+                  <a:srgbClr val="000000"/>
+                </a:solidFill>
+              </a:rPr>
+              <a:t>, welches n-back-Level </a:t>
+            </a:r>
+            <a:r>
+              <a:rPr lang="en-GB" sz="1600" dirty="0" err="1" smtClean="0">
+                <a:solidFill>
+                  <a:srgbClr val="000000"/>
+                </a:solidFill>
+              </a:rPr>
+              <a:t>oder</a:t>
+            </a:r>
+            <a:r>
+              <a:rPr lang="en-GB" sz="1600" dirty="0" smtClean="0">
+                <a:solidFill>
+                  <a:srgbClr val="000000"/>
+                </a:solidFill>
+              </a:rPr>
+              <a:t> </a:t>
+            </a:r>
+            <a:r>
+              <a:rPr lang="en-GB" sz="1600" dirty="0" err="1" smtClean="0">
+                <a:solidFill>
+                  <a:srgbClr val="000000"/>
+                </a:solidFill>
+              </a:rPr>
+              <a:t>welche</a:t>
+            </a:r>
+            <a:r>
+              <a:rPr lang="en-GB" sz="1600" dirty="0" smtClean="0">
+                <a:solidFill>
+                  <a:srgbClr val="000000"/>
+                </a:solidFill>
+              </a:rPr>
+              <a:t> </a:t>
+            </a:r>
+            <a:r>
+              <a:rPr lang="en-GB" sz="1600" dirty="0" err="1" smtClean="0">
+                <a:solidFill>
+                  <a:srgbClr val="000000"/>
+                </a:solidFill>
+              </a:rPr>
+              <a:t>Strategie</a:t>
+            </a:r>
+            <a:r>
+              <a:rPr lang="en-GB" sz="1600" dirty="0" smtClean="0">
+                <a:solidFill>
+                  <a:srgbClr val="000000"/>
+                </a:solidFill>
+              </a:rPr>
+              <a:t> am </a:t>
+            </a:r>
+            <a:r>
+              <a:rPr lang="en-GB" sz="1600" dirty="0" err="1" smtClean="0">
+                <a:solidFill>
+                  <a:srgbClr val="000000"/>
+                </a:solidFill>
+              </a:rPr>
+              <a:t>Ende</a:t>
+            </a:r>
+            <a:r>
+              <a:rPr lang="en-GB" sz="1600" dirty="0" smtClean="0">
+                <a:solidFill>
+                  <a:srgbClr val="000000"/>
+                </a:solidFill>
+              </a:rPr>
+              <a:t> der </a:t>
+            </a:r>
+            <a:r>
+              <a:rPr lang="en-GB" sz="1600" dirty="0" err="1" smtClean="0">
+                <a:solidFill>
+                  <a:srgbClr val="000000"/>
+                </a:solidFill>
+              </a:rPr>
+              <a:t>Erhebung</a:t>
+            </a:r>
+            <a:r>
+              <a:rPr lang="en-GB" sz="1600" dirty="0" smtClean="0">
+                <a:solidFill>
+                  <a:srgbClr val="000000"/>
+                </a:solidFill>
+              </a:rPr>
+              <a:t> </a:t>
+            </a:r>
+            <a:r>
+              <a:rPr lang="en-GB" sz="1600" dirty="0" err="1" smtClean="0">
+                <a:solidFill>
+                  <a:srgbClr val="000000"/>
+                </a:solidFill>
+              </a:rPr>
+              <a:t>nochmal</a:t>
+            </a:r>
+            <a:r>
+              <a:rPr lang="en-GB" sz="1600" dirty="0" smtClean="0">
+                <a:solidFill>
+                  <a:srgbClr val="000000"/>
+                </a:solidFill>
+              </a:rPr>
+              <a:t> </a:t>
+            </a:r>
+            <a:r>
+              <a:rPr lang="en-GB" sz="1600" dirty="0" err="1" smtClean="0">
+                <a:solidFill>
+                  <a:srgbClr val="000000"/>
+                </a:solidFill>
+              </a:rPr>
+              <a:t>wiederholt</a:t>
+            </a:r>
+            <a:r>
+              <a:rPr lang="en-GB" sz="1600" dirty="0" smtClean="0">
+                <a:solidFill>
+                  <a:srgbClr val="000000"/>
+                </a:solidFill>
+              </a:rPr>
+              <a:t> </a:t>
+            </a:r>
+            <a:r>
+              <a:rPr lang="en-GB" sz="1600" dirty="0" err="1" smtClean="0">
+                <a:solidFill>
+                  <a:srgbClr val="000000"/>
+                </a:solidFill>
+              </a:rPr>
+              <a:t>wird</a:t>
+            </a:r>
+            <a:r>
+              <a:rPr lang="en-GB" sz="1600" dirty="0" smtClean="0">
+                <a:solidFill>
+                  <a:srgbClr val="000000"/>
+                </a:solidFill>
+              </a:rPr>
+              <a:t>?</a:t>
+            </a:r>
+          </a:p>
+          <a:p>
             <a:endParaRPr lang="en-GB" sz="1600" dirty="0" smtClean="0">
               <a:solidFill>
                 <a:srgbClr val="000000"/>
@@ -16768,7 +16732,7 @@
                   <a:srgbClr val="000000"/>
                 </a:solidFill>
               </a:rPr>
-              <a:t>Wovon</a:t>
+              <a:t>Wann</a:t>
             </a:r>
             <a:r>
               <a:rPr lang="en-GB" sz="1600" dirty="0" smtClean="0">
@@ -16784,7 +16748,7 @@
                   <a:srgbClr val="000000"/>
                 </a:solidFill>
               </a:rPr>
-              <a:t>machen</a:t>
+              <a:t>sollten</a:t>
             </a:r>
             <a:r>
               <a:rPr lang="en-GB" sz="1600" dirty="0" smtClean="0">
@@ -16792,6 +16756,22 @@
                   <a:srgbClr val="000000"/>
                 </a:solidFill>
               </a:rPr>
+              <a:t> die </a:t>
+            </a:r>
+            <a:r>
+              <a:rPr lang="en-GB" sz="1600" dirty="0" err="1" smtClean="0">
+                <a:solidFill>
+                  <a:srgbClr val="000000"/>
+                </a:solidFill>
+              </a:rPr>
+              <a:t>Persönlichkeitsfragebögen</a:t>
+            </a:r>
+            <a:r>
+              <a:rPr lang="en-GB" sz="1600" dirty="0" smtClean="0">
+                <a:solidFill>
+                  <a:srgbClr val="000000"/>
+                </a:solidFill>
+              </a:rPr>
               <a:t> </a:t>
             </a:r>
             <a:r>
@@ -16800,6 +16780,83 @@
                   <a:srgbClr val="000000"/>
                 </a:solidFill>
               </a:rPr>
+              <a:t>ausgefüllt</a:t>
+            </a:r>
+            <a:r>
+              <a:rPr lang="en-GB" sz="1600" dirty="0" smtClean="0">
+                <a:solidFill>
+                  <a:srgbClr val="000000"/>
+                </a:solidFill>
+              </a:rPr>
+              <a:t> </a:t>
+            </a:r>
+            <a:r>
+              <a:rPr lang="en-GB" sz="1600" dirty="0" err="1" smtClean="0">
+                <a:solidFill>
+                  <a:srgbClr val="000000"/>
+                </a:solidFill>
+              </a:rPr>
+              <a:t>werden</a:t>
+            </a:r>
+            <a:r>
+              <a:rPr lang="en-GB" sz="1600" dirty="0" smtClean="0">
+                <a:solidFill>
+                  <a:srgbClr val="000000"/>
+                </a:solidFill>
+              </a:rPr>
+              <a:t>?</a:t>
+            </a:r>
+          </a:p>
+          <a:p>
+            <a:endParaRPr lang="en-GB" sz="1600" dirty="0" smtClean="0">
+              <a:solidFill>
+                <a:srgbClr val="000000"/>
+              </a:solidFill>
+            </a:endParaRPr>
+          </a:p>
+          <a:p>
+            <a:pPr marL="285750" indent="-285750">
+              <a:buFontTx/>
+              <a:buChar char="-"/>
+            </a:pPr>
+            <a:r>
+              <a:rPr lang="en-GB" sz="1600" dirty="0" err="1" smtClean="0">
+                <a:solidFill>
+                  <a:srgbClr val="000000"/>
+                </a:solidFill>
+              </a:rPr>
+              <a:t>Welche</a:t>
+            </a:r>
+            <a:r>
+              <a:rPr lang="en-GB" sz="1600" dirty="0" smtClean="0">
+                <a:solidFill>
+                  <a:srgbClr val="000000"/>
+                </a:solidFill>
+              </a:rPr>
+              <a:t> Confounds </a:t>
+            </a:r>
+            <a:r>
+              <a:rPr lang="en-GB" sz="1600" dirty="0" err="1" smtClean="0">
+                <a:solidFill>
+                  <a:srgbClr val="000000"/>
+                </a:solidFill>
+              </a:rPr>
+              <a:t>sollten</a:t>
+            </a:r>
+            <a:r>
+              <a:rPr lang="en-GB" sz="1600" dirty="0" smtClean="0">
+                <a:solidFill>
+                  <a:srgbClr val="000000"/>
+                </a:solidFill>
+              </a:rPr>
+              <a:t> </a:t>
+            </a:r>
+            <a:r>
+              <a:rPr lang="en-GB" sz="1600" dirty="0" err="1" smtClean="0">
+                <a:solidFill>
+                  <a:srgbClr val="000000"/>
+                </a:solidFill>
+              </a:rPr>
               <a:t>wir</a:t>
             </a:r>
             <a:r>
@@ -16816,7 +16873,7 @@
                   <a:srgbClr val="000000"/>
                 </a:solidFill>
               </a:rPr>
-              <a:t>abhängig</a:t>
+              <a:t>noch</a:t>
             </a:r>
             <a:r>
               <a:rPr lang="en-GB" sz="1600" dirty="0" smtClean="0">
@@ -16824,7 +16881,7 @@
                   <a:srgbClr val="000000"/>
                 </a:solidFill>
               </a:rPr>
-              <a:t>, welches n-back-Level </a:t>
+              <a:t> </a:t>
             </a:r>
             <a:r>
               <a:rPr lang="en-GB" sz="1600" dirty="0" err="1" smtClean="0">
@@ -16832,7 +16889,7 @@
                   <a:srgbClr val="000000"/>
                 </a:solidFill>
               </a:rPr>
-              <a:t>oder</a:t>
+              <a:t>berücksichtigen</a:t>
             </a:r>
             <a:r>
               <a:rPr lang="en-GB" sz="1600" dirty="0" smtClean="0">
@@ -16840,7 +16897,7 @@
                   <a:srgbClr val="000000"/>
                 </a:solidFill>
               </a:rPr>
-              <a:t> </a:t>
+              <a:t>/</a:t>
             </a:r>
             <a:r>
               <a:rPr lang="en-GB" sz="1600" dirty="0" err="1" smtClean="0">
@@ -16848,7 +16905,7 @@
                   <a:srgbClr val="000000"/>
                 </a:solidFill>
               </a:rPr>
-              <a:t>welche</a:t>
+              <a:t>miterheben</a:t>
             </a:r>
             <a:r>
               <a:rPr lang="en-GB" sz="1600" dirty="0" smtClean="0">
@@ -16856,104 +16913,13 @@
                   <a:srgbClr val="000000"/>
                 </a:solidFill>
               </a:rPr>
-              <a:t> </a:t>
-            </a:r>
-            <a:r>
-              <a:rPr lang="en-GB" sz="1600" dirty="0" err="1" smtClean="0">
-                <a:solidFill>
-                  <a:srgbClr val="000000"/>
-                </a:solidFill>
-              </a:rPr>
-              <a:t>Strategie</a:t>
-            </a:r>
-            <a:r>
-              <a:rPr lang="en-GB" sz="1600" dirty="0" smtClean="0">
-                <a:solidFill>
-                  <a:srgbClr val="000000"/>
-                </a:solidFill>
-              </a:rPr>
-              <a:t> am </a:t>
-            </a:r>
-            <a:r>
-              <a:rPr lang="en-GB" sz="1600" dirty="0" err="1" smtClean="0">
-                <a:solidFill>
-                  <a:srgbClr val="000000"/>
-                </a:solidFill>
-              </a:rPr>
-              <a:t>Ende</a:t>
-            </a:r>
-            <a:r>
-              <a:rPr lang="en-GB" sz="1600" dirty="0" smtClean="0">
-                <a:solidFill>
-                  <a:srgbClr val="000000"/>
-                </a:solidFill>
-              </a:rPr>
-              <a:t> der </a:t>
-            </a:r>
-            <a:r>
-              <a:rPr lang="en-GB" sz="1600" dirty="0" err="1" smtClean="0">
-                <a:solidFill>
-                  <a:srgbClr val="000000"/>
-                </a:solidFill>
-              </a:rPr>
-              <a:t>Erhebung</a:t>
-            </a:r>
-            <a:r>
-              <a:rPr lang="en-GB" sz="1600" dirty="0" smtClean="0">
-                <a:solidFill>
-                  <a:srgbClr val="000000"/>
-                </a:solidFill>
-              </a:rPr>
-              <a:t> </a:t>
-            </a:r>
-            <a:r>
-              <a:rPr lang="en-GB" sz="1600" dirty="0" err="1" smtClean="0">
-                <a:solidFill>
-                  <a:srgbClr val="000000"/>
-                </a:solidFill>
-              </a:rPr>
-              <a:t>nochmal</a:t>
-            </a:r>
-            <a:r>
-              <a:rPr lang="en-GB" sz="1600" dirty="0" smtClean="0">
-                <a:solidFill>
-                  <a:srgbClr val="000000"/>
-                </a:solidFill>
-              </a:rPr>
-              <a:t> </a:t>
-            </a:r>
-            <a:r>
-              <a:rPr lang="en-GB" sz="1600" dirty="0" err="1" smtClean="0">
-                <a:solidFill>
-                  <a:srgbClr val="000000"/>
-                </a:solidFill>
-              </a:rPr>
-              <a:t>wiederholt</a:t>
-            </a:r>
-            <a:r>
-              <a:rPr lang="en-GB" sz="1600" dirty="0" smtClean="0">
-                <a:solidFill>
-                  <a:srgbClr val="000000"/>
-                </a:solidFill>
-              </a:rPr>
-              <a:t> </a:t>
-            </a:r>
-            <a:r>
-              <a:rPr lang="en-GB" sz="1600" dirty="0" err="1" smtClean="0">
-                <a:solidFill>
-                  <a:srgbClr val="000000"/>
-                </a:solidFill>
-              </a:rPr>
-              <a:t>wird</a:t>
-            </a:r>
-            <a:r>
-              <a:rPr lang="en-GB" sz="1600" dirty="0" smtClean="0">
-                <a:solidFill>
-                  <a:srgbClr val="000000"/>
-                </a:solidFill>
-              </a:rPr>
               <a:t>?</a:t>
             </a:r>
+            <a:endParaRPr lang="en-GB" sz="1600" dirty="0" smtClean="0">
+              <a:solidFill>
+                <a:srgbClr val="000000"/>
+              </a:solidFill>
+            </a:endParaRPr>
           </a:p>
           <a:p>
             <a:endParaRPr lang="en-GB" sz="1600" dirty="0" smtClean="0">

</xml_diff>